<commit_message>
Trials are read from a text file
</commit_message>
<xml_diff>
--- a/images/env_images.pptx
+++ b/images/env_images.pptx
@@ -5,7 +5,7 @@
     <p:sldMasterId id="2147483648" r:id="rId1"/>
   </p:sldMasterIdLst>
   <p:notesMasterIdLst>
-    <p:notesMasterId r:id="rId12"/>
+    <p:notesMasterId r:id="rId13"/>
   </p:notesMasterIdLst>
   <p:sldIdLst>
     <p:sldId id="256" r:id="rId2"/>
@@ -18,6 +18,7 @@
     <p:sldId id="260" r:id="rId9"/>
     <p:sldId id="261" r:id="rId10"/>
     <p:sldId id="265" r:id="rId11"/>
+    <p:sldId id="266" r:id="rId12"/>
   </p:sldIdLst>
   <p:sldSz cx="12192000" cy="6858000"/>
   <p:notesSz cx="6858000" cy="9144000"/>
@@ -4259,10 +4260,1113 @@
           </a:p>
         </p:txBody>
       </p:sp>
+      <p:sp>
+        <p:nvSpPr>
+          <p:cNvPr id="6" name="Cross 5">
+            <a:extLst>
+              <a:ext uri="{FF2B5EF4-FFF2-40B4-BE49-F238E27FC236}">
+                <a16:creationId xmlns:a16="http://schemas.microsoft.com/office/drawing/2014/main" id="{03049DA5-3263-C779-13CD-51740255A264}"/>
+              </a:ext>
+            </a:extLst>
+          </p:cNvPr>
+          <p:cNvSpPr/>
+          <p:nvPr/>
+        </p:nvSpPr>
+        <p:spPr>
+          <a:xfrm>
+            <a:off x="8695764" y="1949824"/>
+            <a:ext cx="2675965" cy="2675964"/>
+          </a:xfrm>
+          <a:prstGeom prst="plus">
+            <a:avLst>
+              <a:gd name="adj" fmla="val 31533"/>
+            </a:avLst>
+          </a:prstGeom>
+          <a:solidFill>
+            <a:srgbClr val="00B050"/>
+          </a:solidFill>
+          <a:ln>
+            <a:solidFill>
+              <a:srgbClr val="00B050"/>
+            </a:solidFill>
+          </a:ln>
+        </p:spPr>
+        <p:style>
+          <a:lnRef idx="2">
+            <a:schemeClr val="accent1">
+              <a:shade val="50000"/>
+            </a:schemeClr>
+          </a:lnRef>
+          <a:fillRef idx="1">
+            <a:schemeClr val="accent1"/>
+          </a:fillRef>
+          <a:effectRef idx="0">
+            <a:schemeClr val="accent1"/>
+          </a:effectRef>
+          <a:fontRef idx="minor">
+            <a:schemeClr val="lt1"/>
+          </a:fontRef>
+        </p:style>
+        <p:txBody>
+          <a:bodyPr rtlCol="0" anchor="ctr"/>
+          <a:lstStyle/>
+          <a:p>
+            <a:pPr algn="ctr"/>
+            <a:endParaRPr lang="en-SE"/>
+          </a:p>
+        </p:txBody>
+      </p:sp>
     </p:spTree>
     <p:extLst>
       <p:ext uri="{BB962C8B-B14F-4D97-AF65-F5344CB8AC3E}">
         <p14:creationId xmlns:p14="http://schemas.microsoft.com/office/powerpoint/2010/main" val="952992081"/>
+      </p:ext>
+    </p:extLst>
+  </p:cSld>
+  <p:clrMapOvr>
+    <a:masterClrMapping/>
+  </p:clrMapOvr>
+</p:sld>
+</file>
+
+<file path=ppt/slides/slide11.xml><?xml version="1.0" encoding="utf-8"?>
+<p:sld xmlns:a="http://schemas.openxmlformats.org/drawingml/2006/main" xmlns:r="http://schemas.openxmlformats.org/officeDocument/2006/relationships" xmlns:p="http://schemas.openxmlformats.org/presentationml/2006/main">
+  <p:cSld>
+    <p:bg>
+      <p:bgPr>
+        <a:solidFill>
+          <a:schemeClr val="tx1"/>
+        </a:solidFill>
+        <a:effectLst/>
+      </p:bgPr>
+    </p:bg>
+    <p:spTree>
+      <p:nvGrpSpPr>
+        <p:cNvPr id="1" name=""/>
+        <p:cNvGrpSpPr/>
+        <p:nvPr/>
+      </p:nvGrpSpPr>
+      <p:grpSpPr>
+        <a:xfrm>
+          <a:off x="0" y="0"/>
+          <a:ext cx="0" cy="0"/>
+          <a:chOff x="0" y="0"/>
+          <a:chExt cx="0" cy="0"/>
+        </a:xfrm>
+      </p:grpSpPr>
+      <p:grpSp>
+        <p:nvGrpSpPr>
+          <p:cNvPr id="34" name="Group 33">
+            <a:extLst>
+              <a:ext uri="{FF2B5EF4-FFF2-40B4-BE49-F238E27FC236}">
+                <a16:creationId xmlns:a16="http://schemas.microsoft.com/office/drawing/2014/main" id="{386A8F6B-BEC4-05AF-3D10-BE46DAEE6568}"/>
+              </a:ext>
+            </a:extLst>
+          </p:cNvPr>
+          <p:cNvGrpSpPr/>
+          <p:nvPr/>
+        </p:nvGrpSpPr>
+        <p:grpSpPr>
+          <a:xfrm>
+            <a:off x="293511" y="1657051"/>
+            <a:ext cx="9196944" cy="4248018"/>
+            <a:chOff x="293511" y="1657051"/>
+            <a:chExt cx="9196944" cy="4248018"/>
+          </a:xfrm>
+        </p:grpSpPr>
+        <p:grpSp>
+          <p:nvGrpSpPr>
+            <p:cNvPr id="2" name="Group 1">
+              <a:extLst>
+                <a:ext uri="{FF2B5EF4-FFF2-40B4-BE49-F238E27FC236}">
+                  <a16:creationId xmlns:a16="http://schemas.microsoft.com/office/drawing/2014/main" id="{6740B972-17D0-0058-E920-7073DB5BDE87}"/>
+                </a:ext>
+              </a:extLst>
+            </p:cNvPr>
+            <p:cNvGrpSpPr/>
+            <p:nvPr/>
+          </p:nvGrpSpPr>
+          <p:grpSpPr>
+            <a:xfrm>
+              <a:off x="293511" y="2286480"/>
+              <a:ext cx="2285199" cy="2285039"/>
+              <a:chOff x="3483422" y="103762"/>
+              <a:chExt cx="5225155" cy="5885235"/>
+            </a:xfrm>
+          </p:grpSpPr>
+          <p:pic>
+            <p:nvPicPr>
+              <p:cNvPr id="3" name="Picture 2" descr="A picture containing outdoor object, automaton&#10;&#10;Description automatically generated">
+                <a:extLst>
+                  <a:ext uri="{FF2B5EF4-FFF2-40B4-BE49-F238E27FC236}">
+                    <a16:creationId xmlns:a16="http://schemas.microsoft.com/office/drawing/2014/main" id="{74526FB5-8BCA-1F2C-C90A-AE298B5D21B3}"/>
+                  </a:ext>
+                </a:extLst>
+              </p:cNvPr>
+              <p:cNvPicPr>
+                <a:picLocks noChangeAspect="1"/>
+              </p:cNvPicPr>
+              <p:nvPr/>
+            </p:nvPicPr>
+            <p:blipFill>
+              <a:blip r:embed="rId2">
+                <a:extLst>
+                  <a:ext uri="{BEBA8EAE-BF5A-486C-A8C5-ECC9F3942E4B}">
+                    <a14:imgProps xmlns:a14="http://schemas.microsoft.com/office/drawing/2010/main">
+                      <a14:imgLayer r:embed="rId3">
+                        <a14:imgEffect>
+                          <a14:backgroundRemoval t="1905" b="99524" l="10000" r="90000">
+                            <a14:foregroundMark x1="17250" y1="96190" x2="17250" y2="96190"/>
+                            <a14:foregroundMark x1="20584" y1="93175" x2="20500" y2="96508"/>
+                            <a14:foregroundMark x1="20333" y1="97460" x2="20833" y2="97143"/>
+                            <a14:foregroundMark x1="43167" y1="93333" x2="54000" y2="94762"/>
+                            <a14:foregroundMark x1="75583" y1="94603" x2="75583" y2="90000"/>
+                            <a14:foregroundMark x1="79083" y1="94603" x2="79083" y2="89524"/>
+                            <a14:foregroundMark x1="17000" y1="97143" x2="17583" y2="86349"/>
+                            <a14:foregroundMark x1="46417" y1="8095" x2="53500" y2="8095"/>
+                            <a14:foregroundMark x1="47000" y1="2540" x2="53333" y2="2063"/>
+                            <a14:foregroundMark x1="45250" y1="99365" x2="54000" y2="99524"/>
+                            <a14:foregroundMark x1="43917" y1="98095" x2="43917" y2="99524"/>
+                            <a14:foregroundMark x1="20750" y1="86984" x2="20833" y2="89524"/>
+                            <a14:backgroundMark x1="19000" y1="89365" x2="18833" y2="94127"/>
+                            <a14:backgroundMark x1="19750" y1="87302" x2="20500" y2="90000"/>
+                            <a14:backgroundMark x1="20083" y1="91429" x2="20083" y2="93175"/>
+                            <a14:backgroundMark x1="20250" y1="90317" x2="20333" y2="92381"/>
+                            <a14:backgroundMark x1="20250" y1="89593" x2="20250" y2="90317"/>
+                          </a14:backgroundRemoval>
+                        </a14:imgEffect>
+                      </a14:imgLayer>
+                    </a14:imgProps>
+                  </a:ext>
+                </a:extLst>
+              </a:blip>
+              <a:stretch>
+                <a:fillRect/>
+              </a:stretch>
+            </p:blipFill>
+            <p:spPr>
+              <a:xfrm>
+                <a:off x="3483422" y="103762"/>
+                <a:ext cx="5225155" cy="2743206"/>
+              </a:xfrm>
+              <a:prstGeom prst="rect">
+                <a:avLst/>
+              </a:prstGeom>
+            </p:spPr>
+          </p:pic>
+          <p:sp>
+            <p:nvSpPr>
+              <p:cNvPr id="4" name="Rectangle 3">
+                <a:extLst>
+                  <a:ext uri="{FF2B5EF4-FFF2-40B4-BE49-F238E27FC236}">
+                    <a16:creationId xmlns:a16="http://schemas.microsoft.com/office/drawing/2014/main" id="{D1FEE2A2-DEC0-AF74-2BA0-BA93AE481801}"/>
+                  </a:ext>
+                </a:extLst>
+              </p:cNvPr>
+              <p:cNvSpPr/>
+              <p:nvPr/>
+            </p:nvSpPr>
+            <p:spPr>
+              <a:xfrm>
+                <a:off x="3774331" y="5295090"/>
+                <a:ext cx="1050587" cy="693907"/>
+              </a:xfrm>
+              <a:prstGeom prst="rect">
+                <a:avLst/>
+              </a:prstGeom>
+              <a:solidFill>
+                <a:schemeClr val="bg2">
+                  <a:lumMod val="90000"/>
+                </a:schemeClr>
+              </a:solidFill>
+            </p:spPr>
+            <p:style>
+              <a:lnRef idx="2">
+                <a:schemeClr val="accent1">
+                  <a:shade val="50000"/>
+                </a:schemeClr>
+              </a:lnRef>
+              <a:fillRef idx="1">
+                <a:schemeClr val="accent1"/>
+              </a:fillRef>
+              <a:effectRef idx="0">
+                <a:schemeClr val="accent1"/>
+              </a:effectRef>
+              <a:fontRef idx="minor">
+                <a:schemeClr val="lt1"/>
+              </a:fontRef>
+            </p:style>
+            <p:txBody>
+              <a:bodyPr rtlCol="0" anchor="ctr"/>
+              <a:lstStyle/>
+              <a:p>
+                <a:pPr algn="ctr"/>
+                <a:r>
+                  <a:rPr lang="en-SE" dirty="0">
+                    <a:solidFill>
+                      <a:schemeClr val="tx1"/>
+                    </a:solidFill>
+                  </a:rPr>
+                  <a:t>C</a:t>
+                </a:r>
+              </a:p>
+            </p:txBody>
+          </p:sp>
+          <p:sp>
+            <p:nvSpPr>
+              <p:cNvPr id="5" name="Rectangle 4">
+                <a:extLst>
+                  <a:ext uri="{FF2B5EF4-FFF2-40B4-BE49-F238E27FC236}">
+                    <a16:creationId xmlns:a16="http://schemas.microsoft.com/office/drawing/2014/main" id="{C3A56317-333B-C11A-7684-6E3DCCC4526A}"/>
+                  </a:ext>
+                </a:extLst>
+              </p:cNvPr>
+              <p:cNvSpPr/>
+              <p:nvPr/>
+            </p:nvSpPr>
+            <p:spPr>
+              <a:xfrm>
+                <a:off x="3774331" y="3560327"/>
+                <a:ext cx="1050587" cy="693907"/>
+              </a:xfrm>
+              <a:prstGeom prst="rect">
+                <a:avLst/>
+              </a:prstGeom>
+              <a:solidFill>
+                <a:schemeClr val="bg2">
+                  <a:lumMod val="90000"/>
+                </a:schemeClr>
+              </a:solidFill>
+            </p:spPr>
+            <p:style>
+              <a:lnRef idx="2">
+                <a:schemeClr val="accent1">
+                  <a:shade val="50000"/>
+                </a:schemeClr>
+              </a:lnRef>
+              <a:fillRef idx="1">
+                <a:schemeClr val="accent1"/>
+              </a:fillRef>
+              <a:effectRef idx="0">
+                <a:schemeClr val="accent1"/>
+              </a:effectRef>
+              <a:fontRef idx="minor">
+                <a:schemeClr val="lt1"/>
+              </a:fontRef>
+            </p:style>
+            <p:txBody>
+              <a:bodyPr rtlCol="0" anchor="ctr"/>
+              <a:lstStyle/>
+              <a:p>
+                <a:pPr algn="ctr"/>
+                <a:r>
+                  <a:rPr lang="en-SE" dirty="0">
+                    <a:solidFill>
+                      <a:schemeClr val="tx1"/>
+                    </a:solidFill>
+                  </a:rPr>
+                  <a:t>A</a:t>
+                </a:r>
+              </a:p>
+            </p:txBody>
+          </p:sp>
+          <p:sp>
+            <p:nvSpPr>
+              <p:cNvPr id="6" name="Rectangle 5">
+                <a:extLst>
+                  <a:ext uri="{FF2B5EF4-FFF2-40B4-BE49-F238E27FC236}">
+                    <a16:creationId xmlns:a16="http://schemas.microsoft.com/office/drawing/2014/main" id="{2202A0EF-74F7-6FAD-BD06-C300EC9B4700}"/>
+                  </a:ext>
+                </a:extLst>
+              </p:cNvPr>
+              <p:cNvSpPr/>
+              <p:nvPr/>
+            </p:nvSpPr>
+            <p:spPr>
+              <a:xfrm>
+                <a:off x="7464356" y="3560327"/>
+                <a:ext cx="1050587" cy="693907"/>
+              </a:xfrm>
+              <a:prstGeom prst="rect">
+                <a:avLst/>
+              </a:prstGeom>
+              <a:solidFill>
+                <a:schemeClr val="bg2">
+                  <a:lumMod val="90000"/>
+                </a:schemeClr>
+              </a:solidFill>
+            </p:spPr>
+            <p:style>
+              <a:lnRef idx="2">
+                <a:schemeClr val="accent1">
+                  <a:shade val="50000"/>
+                </a:schemeClr>
+              </a:lnRef>
+              <a:fillRef idx="1">
+                <a:schemeClr val="accent1"/>
+              </a:fillRef>
+              <a:effectRef idx="0">
+                <a:schemeClr val="accent1"/>
+              </a:effectRef>
+              <a:fontRef idx="minor">
+                <a:schemeClr val="lt1"/>
+              </a:fontRef>
+            </p:style>
+            <p:txBody>
+              <a:bodyPr rtlCol="0" anchor="ctr"/>
+              <a:lstStyle/>
+              <a:p>
+                <a:pPr algn="ctr"/>
+                <a:r>
+                  <a:rPr lang="en-SE" dirty="0">
+                    <a:solidFill>
+                      <a:schemeClr val="tx1"/>
+                    </a:solidFill>
+                  </a:rPr>
+                  <a:t>B</a:t>
+                </a:r>
+              </a:p>
+            </p:txBody>
+          </p:sp>
+          <p:sp>
+            <p:nvSpPr>
+              <p:cNvPr id="7" name="Rectangle 6">
+                <a:extLst>
+                  <a:ext uri="{FF2B5EF4-FFF2-40B4-BE49-F238E27FC236}">
+                    <a16:creationId xmlns:a16="http://schemas.microsoft.com/office/drawing/2014/main" id="{AF032177-9496-1896-6401-90542C5A3D0C}"/>
+                  </a:ext>
+                </a:extLst>
+              </p:cNvPr>
+              <p:cNvSpPr/>
+              <p:nvPr/>
+            </p:nvSpPr>
+            <p:spPr>
+              <a:xfrm>
+                <a:off x="7464357" y="5295089"/>
+                <a:ext cx="1050587" cy="693907"/>
+              </a:xfrm>
+              <a:prstGeom prst="rect">
+                <a:avLst/>
+              </a:prstGeom>
+              <a:solidFill>
+                <a:schemeClr val="bg2">
+                  <a:lumMod val="90000"/>
+                </a:schemeClr>
+              </a:solidFill>
+            </p:spPr>
+            <p:style>
+              <a:lnRef idx="2">
+                <a:schemeClr val="accent1">
+                  <a:shade val="50000"/>
+                </a:schemeClr>
+              </a:lnRef>
+              <a:fillRef idx="1">
+                <a:schemeClr val="accent1"/>
+              </a:fillRef>
+              <a:effectRef idx="0">
+                <a:schemeClr val="accent1"/>
+              </a:effectRef>
+              <a:fontRef idx="minor">
+                <a:schemeClr val="lt1"/>
+              </a:fontRef>
+            </p:style>
+            <p:txBody>
+              <a:bodyPr rtlCol="0" anchor="ctr"/>
+              <a:lstStyle/>
+              <a:p>
+                <a:pPr algn="ctr"/>
+                <a:r>
+                  <a:rPr lang="en-SE" dirty="0">
+                    <a:solidFill>
+                      <a:schemeClr val="tx1"/>
+                    </a:solidFill>
+                  </a:rPr>
+                  <a:t>D</a:t>
+                </a:r>
+              </a:p>
+            </p:txBody>
+          </p:sp>
+          <p:sp>
+            <p:nvSpPr>
+              <p:cNvPr id="8" name="Up Arrow 7">
+                <a:extLst>
+                  <a:ext uri="{FF2B5EF4-FFF2-40B4-BE49-F238E27FC236}">
+                    <a16:creationId xmlns:a16="http://schemas.microsoft.com/office/drawing/2014/main" id="{5D20C4E9-BDC0-0C1E-0615-D757D8505054}"/>
+                  </a:ext>
+                </a:extLst>
+              </p:cNvPr>
+              <p:cNvSpPr/>
+              <p:nvPr/>
+            </p:nvSpPr>
+            <p:spPr>
+              <a:xfrm rot="1818879">
+                <a:off x="4999388" y="1786167"/>
+                <a:ext cx="484632" cy="3221999"/>
+              </a:xfrm>
+              <a:prstGeom prst="upArrow">
+                <a:avLst>
+                  <a:gd name="adj1" fmla="val 50000"/>
+                  <a:gd name="adj2" fmla="val 94395"/>
+                </a:avLst>
+              </a:prstGeom>
+              <a:solidFill>
+                <a:schemeClr val="accent4"/>
+              </a:solidFill>
+              <a:ln w="28575">
+                <a:solidFill>
+                  <a:schemeClr val="tx1"/>
+                </a:solidFill>
+              </a:ln>
+            </p:spPr>
+            <p:style>
+              <a:lnRef idx="2">
+                <a:schemeClr val="accent1">
+                  <a:shade val="50000"/>
+                </a:schemeClr>
+              </a:lnRef>
+              <a:fillRef idx="1">
+                <a:schemeClr val="accent1"/>
+              </a:fillRef>
+              <a:effectRef idx="0">
+                <a:schemeClr val="accent1"/>
+              </a:effectRef>
+              <a:fontRef idx="minor">
+                <a:schemeClr val="lt1"/>
+              </a:fontRef>
+            </p:style>
+            <p:txBody>
+              <a:bodyPr rtlCol="0" anchor="ctr"/>
+              <a:lstStyle/>
+              <a:p>
+                <a:pPr algn="ctr"/>
+                <a:endParaRPr lang="en-SE"/>
+              </a:p>
+            </p:txBody>
+          </p:sp>
+        </p:grpSp>
+        <p:sp>
+          <p:nvSpPr>
+            <p:cNvPr id="9" name="Right Arrow 8">
+              <a:extLst>
+                <a:ext uri="{FF2B5EF4-FFF2-40B4-BE49-F238E27FC236}">
+                  <a16:creationId xmlns:a16="http://schemas.microsoft.com/office/drawing/2014/main" id="{A0FFEECB-9FC4-4C8A-8B96-D08689112CC6}"/>
+                </a:ext>
+              </a:extLst>
+            </p:cNvPr>
+            <p:cNvSpPr/>
+            <p:nvPr/>
+          </p:nvSpPr>
+          <p:spPr>
+            <a:xfrm>
+              <a:off x="2940482" y="3186684"/>
+              <a:ext cx="978408" cy="484632"/>
+            </a:xfrm>
+            <a:prstGeom prst="rightArrow">
+              <a:avLst/>
+            </a:prstGeom>
+            <a:solidFill>
+              <a:schemeClr val="accent4">
+                <a:lumMod val="40000"/>
+                <a:lumOff val="60000"/>
+              </a:schemeClr>
+            </a:solidFill>
+            <a:ln>
+              <a:solidFill>
+                <a:schemeClr val="accent4">
+                  <a:lumMod val="40000"/>
+                  <a:lumOff val="60000"/>
+                </a:schemeClr>
+              </a:solidFill>
+            </a:ln>
+          </p:spPr>
+          <p:style>
+            <a:lnRef idx="2">
+              <a:schemeClr val="accent1">
+                <a:shade val="50000"/>
+              </a:schemeClr>
+            </a:lnRef>
+            <a:fillRef idx="1">
+              <a:schemeClr val="accent1"/>
+            </a:fillRef>
+            <a:effectRef idx="0">
+              <a:schemeClr val="accent1"/>
+            </a:effectRef>
+            <a:fontRef idx="minor">
+              <a:schemeClr val="lt1"/>
+            </a:fontRef>
+          </p:style>
+          <p:txBody>
+            <a:bodyPr rtlCol="0" anchor="ctr"/>
+            <a:lstStyle/>
+            <a:p>
+              <a:pPr algn="ctr"/>
+              <a:endParaRPr lang="en-SE"/>
+            </a:p>
+          </p:txBody>
+        </p:sp>
+        <p:sp>
+          <p:nvSpPr>
+            <p:cNvPr id="10" name="Cross 9">
+              <a:extLst>
+                <a:ext uri="{FF2B5EF4-FFF2-40B4-BE49-F238E27FC236}">
+                  <a16:creationId xmlns:a16="http://schemas.microsoft.com/office/drawing/2014/main" id="{3D2D1074-0DBC-BB1C-45BF-A6392FCC1541}"/>
+                </a:ext>
+              </a:extLst>
+            </p:cNvPr>
+            <p:cNvSpPr/>
+            <p:nvPr/>
+          </p:nvSpPr>
+          <p:spPr>
+            <a:xfrm>
+              <a:off x="4280662" y="3131172"/>
+              <a:ext cx="601963" cy="595655"/>
+            </a:xfrm>
+            <a:prstGeom prst="plus">
+              <a:avLst>
+                <a:gd name="adj" fmla="val 31533"/>
+              </a:avLst>
+            </a:prstGeom>
+            <a:solidFill>
+              <a:schemeClr val="bg1"/>
+            </a:solidFill>
+            <a:ln>
+              <a:solidFill>
+                <a:schemeClr val="bg1"/>
+              </a:solidFill>
+            </a:ln>
+          </p:spPr>
+          <p:style>
+            <a:lnRef idx="2">
+              <a:schemeClr val="accent1">
+                <a:shade val="50000"/>
+              </a:schemeClr>
+            </a:lnRef>
+            <a:fillRef idx="1">
+              <a:schemeClr val="accent1"/>
+            </a:fillRef>
+            <a:effectRef idx="0">
+              <a:schemeClr val="accent1"/>
+            </a:effectRef>
+            <a:fontRef idx="minor">
+              <a:schemeClr val="lt1"/>
+            </a:fontRef>
+          </p:style>
+          <p:txBody>
+            <a:bodyPr rtlCol="0" anchor="ctr"/>
+            <a:lstStyle/>
+            <a:p>
+              <a:pPr algn="ctr"/>
+              <a:endParaRPr lang="en-SE"/>
+            </a:p>
+          </p:txBody>
+        </p:sp>
+        <p:sp>
+          <p:nvSpPr>
+            <p:cNvPr id="11" name="Right Arrow 10">
+              <a:extLst>
+                <a:ext uri="{FF2B5EF4-FFF2-40B4-BE49-F238E27FC236}">
+                  <a16:creationId xmlns:a16="http://schemas.microsoft.com/office/drawing/2014/main" id="{3E1CE907-6A61-B5DB-C05C-F33D33BAB9C2}"/>
+                </a:ext>
+              </a:extLst>
+            </p:cNvPr>
+            <p:cNvSpPr/>
+            <p:nvPr/>
+          </p:nvSpPr>
+          <p:spPr>
+            <a:xfrm>
+              <a:off x="5244397" y="3143916"/>
+              <a:ext cx="978408" cy="484632"/>
+            </a:xfrm>
+            <a:prstGeom prst="rightArrow">
+              <a:avLst/>
+            </a:prstGeom>
+            <a:solidFill>
+              <a:schemeClr val="accent4">
+                <a:lumMod val="40000"/>
+                <a:lumOff val="60000"/>
+              </a:schemeClr>
+            </a:solidFill>
+            <a:ln>
+              <a:solidFill>
+                <a:schemeClr val="accent4">
+                  <a:lumMod val="40000"/>
+                  <a:lumOff val="60000"/>
+                </a:schemeClr>
+              </a:solidFill>
+            </a:ln>
+          </p:spPr>
+          <p:style>
+            <a:lnRef idx="2">
+              <a:schemeClr val="accent1">
+                <a:shade val="50000"/>
+              </a:schemeClr>
+            </a:lnRef>
+            <a:fillRef idx="1">
+              <a:schemeClr val="accent1"/>
+            </a:fillRef>
+            <a:effectRef idx="0">
+              <a:schemeClr val="accent1"/>
+            </a:effectRef>
+            <a:fontRef idx="minor">
+              <a:schemeClr val="lt1"/>
+            </a:fontRef>
+          </p:style>
+          <p:txBody>
+            <a:bodyPr rtlCol="0" anchor="ctr"/>
+            <a:lstStyle/>
+            <a:p>
+              <a:pPr algn="ctr"/>
+              <a:endParaRPr lang="en-SE"/>
+            </a:p>
+          </p:txBody>
+        </p:sp>
+        <p:sp>
+          <p:nvSpPr>
+            <p:cNvPr id="12" name="Cross 11">
+              <a:extLst>
+                <a:ext uri="{FF2B5EF4-FFF2-40B4-BE49-F238E27FC236}">
+                  <a16:creationId xmlns:a16="http://schemas.microsoft.com/office/drawing/2014/main" id="{0AD5C277-6863-4386-1F21-E249D23F55B8}"/>
+                </a:ext>
+              </a:extLst>
+            </p:cNvPr>
+            <p:cNvSpPr/>
+            <p:nvPr/>
+          </p:nvSpPr>
+          <p:spPr>
+            <a:xfrm>
+              <a:off x="6584577" y="3131172"/>
+              <a:ext cx="601963" cy="595655"/>
+            </a:xfrm>
+            <a:prstGeom prst="plus">
+              <a:avLst>
+                <a:gd name="adj" fmla="val 31533"/>
+              </a:avLst>
+            </a:prstGeom>
+            <a:solidFill>
+              <a:srgbClr val="FF0000"/>
+            </a:solidFill>
+            <a:ln>
+              <a:solidFill>
+                <a:srgbClr val="FF0000"/>
+              </a:solidFill>
+            </a:ln>
+          </p:spPr>
+          <p:style>
+            <a:lnRef idx="2">
+              <a:schemeClr val="accent1">
+                <a:shade val="50000"/>
+              </a:schemeClr>
+            </a:lnRef>
+            <a:fillRef idx="1">
+              <a:schemeClr val="accent1"/>
+            </a:fillRef>
+            <a:effectRef idx="0">
+              <a:schemeClr val="accent1"/>
+            </a:effectRef>
+            <a:fontRef idx="minor">
+              <a:schemeClr val="lt1"/>
+            </a:fontRef>
+          </p:style>
+          <p:txBody>
+            <a:bodyPr rtlCol="0" anchor="ctr"/>
+            <a:lstStyle/>
+            <a:p>
+              <a:pPr algn="ctr"/>
+              <a:endParaRPr lang="en-SE"/>
+            </a:p>
+          </p:txBody>
+        </p:sp>
+        <p:sp>
+          <p:nvSpPr>
+            <p:cNvPr id="13" name="Cross 12">
+              <a:extLst>
+                <a:ext uri="{FF2B5EF4-FFF2-40B4-BE49-F238E27FC236}">
+                  <a16:creationId xmlns:a16="http://schemas.microsoft.com/office/drawing/2014/main" id="{B28A57D5-CD44-3A1E-049C-892F2DCF9D92}"/>
+                </a:ext>
+              </a:extLst>
+            </p:cNvPr>
+            <p:cNvSpPr/>
+            <p:nvPr/>
+          </p:nvSpPr>
+          <p:spPr>
+            <a:xfrm>
+              <a:off x="8888492" y="3088404"/>
+              <a:ext cx="601963" cy="595655"/>
+            </a:xfrm>
+            <a:prstGeom prst="plus">
+              <a:avLst>
+                <a:gd name="adj" fmla="val 31533"/>
+              </a:avLst>
+            </a:prstGeom>
+            <a:solidFill>
+              <a:srgbClr val="00B050"/>
+            </a:solidFill>
+            <a:ln>
+              <a:solidFill>
+                <a:srgbClr val="00B050"/>
+              </a:solidFill>
+            </a:ln>
+          </p:spPr>
+          <p:style>
+            <a:lnRef idx="2">
+              <a:schemeClr val="accent1">
+                <a:shade val="50000"/>
+              </a:schemeClr>
+            </a:lnRef>
+            <a:fillRef idx="1">
+              <a:schemeClr val="accent1"/>
+            </a:fillRef>
+            <a:effectRef idx="0">
+              <a:schemeClr val="accent1"/>
+            </a:effectRef>
+            <a:fontRef idx="minor">
+              <a:schemeClr val="lt1"/>
+            </a:fontRef>
+          </p:style>
+          <p:txBody>
+            <a:bodyPr rtlCol="0" anchor="ctr"/>
+            <a:lstStyle/>
+            <a:p>
+              <a:pPr algn="ctr"/>
+              <a:endParaRPr lang="en-SE"/>
+            </a:p>
+          </p:txBody>
+        </p:sp>
+        <p:sp>
+          <p:nvSpPr>
+            <p:cNvPr id="14" name="Right Arrow 13">
+              <a:extLst>
+                <a:ext uri="{FF2B5EF4-FFF2-40B4-BE49-F238E27FC236}">
+                  <a16:creationId xmlns:a16="http://schemas.microsoft.com/office/drawing/2014/main" id="{D94094D4-D94F-D79E-59CA-B4AAE74B7316}"/>
+                </a:ext>
+              </a:extLst>
+            </p:cNvPr>
+            <p:cNvSpPr/>
+            <p:nvPr/>
+          </p:nvSpPr>
+          <p:spPr>
+            <a:xfrm>
+              <a:off x="7548312" y="3143916"/>
+              <a:ext cx="978408" cy="484632"/>
+            </a:xfrm>
+            <a:prstGeom prst="rightArrow">
+              <a:avLst/>
+            </a:prstGeom>
+            <a:solidFill>
+              <a:schemeClr val="accent4">
+                <a:lumMod val="40000"/>
+                <a:lumOff val="60000"/>
+              </a:schemeClr>
+            </a:solidFill>
+            <a:ln>
+              <a:solidFill>
+                <a:schemeClr val="accent4">
+                  <a:lumMod val="40000"/>
+                  <a:lumOff val="60000"/>
+                </a:schemeClr>
+              </a:solidFill>
+            </a:ln>
+          </p:spPr>
+          <p:style>
+            <a:lnRef idx="2">
+              <a:schemeClr val="accent1">
+                <a:shade val="50000"/>
+              </a:schemeClr>
+            </a:lnRef>
+            <a:fillRef idx="1">
+              <a:schemeClr val="accent1"/>
+            </a:fillRef>
+            <a:effectRef idx="0">
+              <a:schemeClr val="accent1"/>
+            </a:effectRef>
+            <a:fontRef idx="minor">
+              <a:schemeClr val="lt1"/>
+            </a:fontRef>
+          </p:style>
+          <p:txBody>
+            <a:bodyPr rtlCol="0" anchor="ctr"/>
+            <a:lstStyle/>
+            <a:p>
+              <a:pPr algn="ctr"/>
+              <a:endParaRPr lang="en-SE"/>
+            </a:p>
+          </p:txBody>
+        </p:sp>
+        <p:sp>
+          <p:nvSpPr>
+            <p:cNvPr id="24" name="TextBox 23">
+              <a:extLst>
+                <a:ext uri="{FF2B5EF4-FFF2-40B4-BE49-F238E27FC236}">
+                  <a16:creationId xmlns:a16="http://schemas.microsoft.com/office/drawing/2014/main" id="{829B2168-BEAA-B3B2-B2EA-631A15BB85A0}"/>
+                </a:ext>
+              </a:extLst>
+            </p:cNvPr>
+            <p:cNvSpPr txBox="1"/>
+            <p:nvPr/>
+          </p:nvSpPr>
+          <p:spPr>
+            <a:xfrm>
+              <a:off x="3917777" y="1657051"/>
+              <a:ext cx="1327736" cy="523220"/>
+            </a:xfrm>
+            <a:prstGeom prst="rect">
+              <a:avLst/>
+            </a:prstGeom>
+            <a:noFill/>
+          </p:spPr>
+          <p:txBody>
+            <a:bodyPr wrap="none" rtlCol="0">
+              <a:spAutoFit/>
+            </a:bodyPr>
+            <a:lstStyle/>
+            <a:p>
+              <a:pPr algn="ctr"/>
+              <a:r>
+                <a:rPr lang="en-SE" sz="2800" dirty="0">
+                  <a:solidFill>
+                    <a:schemeClr val="bg1"/>
+                  </a:solidFill>
+                </a:rPr>
+                <a:t>Prepare</a:t>
+              </a:r>
+            </a:p>
+          </p:txBody>
+        </p:sp>
+        <p:sp>
+          <p:nvSpPr>
+            <p:cNvPr id="25" name="TextBox 24">
+              <a:extLst>
+                <a:ext uri="{FF2B5EF4-FFF2-40B4-BE49-F238E27FC236}">
+                  <a16:creationId xmlns:a16="http://schemas.microsoft.com/office/drawing/2014/main" id="{C6192308-7EB7-5037-9D6E-45630625C05F}"/>
+                </a:ext>
+              </a:extLst>
+            </p:cNvPr>
+            <p:cNvSpPr txBox="1"/>
+            <p:nvPr/>
+          </p:nvSpPr>
+          <p:spPr>
+            <a:xfrm>
+              <a:off x="585893" y="1657051"/>
+              <a:ext cx="1767600" cy="523220"/>
+            </a:xfrm>
+            <a:prstGeom prst="rect">
+              <a:avLst/>
+            </a:prstGeom>
+            <a:noFill/>
+          </p:spPr>
+          <p:txBody>
+            <a:bodyPr wrap="none" rtlCol="0">
+              <a:spAutoFit/>
+            </a:bodyPr>
+            <a:lstStyle/>
+            <a:p>
+              <a:pPr algn="ctr"/>
+              <a:r>
+                <a:rPr lang="en-SE" sz="2800" dirty="0">
+                  <a:solidFill>
+                    <a:schemeClr val="bg1"/>
+                  </a:solidFill>
+                </a:rPr>
+                <a:t>Instruction</a:t>
+              </a:r>
+            </a:p>
+          </p:txBody>
+        </p:sp>
+        <p:sp>
+          <p:nvSpPr>
+            <p:cNvPr id="26" name="TextBox 25">
+              <a:extLst>
+                <a:ext uri="{FF2B5EF4-FFF2-40B4-BE49-F238E27FC236}">
+                  <a16:creationId xmlns:a16="http://schemas.microsoft.com/office/drawing/2014/main" id="{A372430C-08F2-54E5-AD5A-4EE3B44F9C28}"/>
+                </a:ext>
+              </a:extLst>
+            </p:cNvPr>
+            <p:cNvSpPr txBox="1"/>
+            <p:nvPr/>
+          </p:nvSpPr>
+          <p:spPr>
+            <a:xfrm>
+              <a:off x="6227134" y="1657051"/>
+              <a:ext cx="1319080" cy="523220"/>
+            </a:xfrm>
+            <a:prstGeom prst="rect">
+              <a:avLst/>
+            </a:prstGeom>
+            <a:noFill/>
+          </p:spPr>
+          <p:txBody>
+            <a:bodyPr wrap="none" rtlCol="0">
+              <a:spAutoFit/>
+            </a:bodyPr>
+            <a:lstStyle/>
+            <a:p>
+              <a:pPr algn="ctr"/>
+              <a:r>
+                <a:rPr lang="en-SE" sz="2800" dirty="0">
+                  <a:solidFill>
+                    <a:schemeClr val="bg1"/>
+                  </a:solidFill>
+                </a:rPr>
+                <a:t>Execute</a:t>
+              </a:r>
+            </a:p>
+          </p:txBody>
+        </p:sp>
+        <p:sp>
+          <p:nvSpPr>
+            <p:cNvPr id="27" name="TextBox 26">
+              <a:extLst>
+                <a:ext uri="{FF2B5EF4-FFF2-40B4-BE49-F238E27FC236}">
+                  <a16:creationId xmlns:a16="http://schemas.microsoft.com/office/drawing/2014/main" id="{1FF92C2E-F096-2A15-45BA-B63E3B4A5F51}"/>
+                </a:ext>
+              </a:extLst>
+            </p:cNvPr>
+            <p:cNvSpPr txBox="1"/>
+            <p:nvPr/>
+          </p:nvSpPr>
+          <p:spPr>
+            <a:xfrm>
+              <a:off x="8681323" y="1657051"/>
+              <a:ext cx="809132" cy="523220"/>
+            </a:xfrm>
+            <a:prstGeom prst="rect">
+              <a:avLst/>
+            </a:prstGeom>
+            <a:noFill/>
+          </p:spPr>
+          <p:txBody>
+            <a:bodyPr wrap="none" rtlCol="0">
+              <a:spAutoFit/>
+            </a:bodyPr>
+            <a:lstStyle/>
+            <a:p>
+              <a:pPr algn="ctr"/>
+              <a:r>
+                <a:rPr lang="en-SE" sz="2800" dirty="0">
+                  <a:solidFill>
+                    <a:schemeClr val="bg1"/>
+                  </a:solidFill>
+                </a:rPr>
+                <a:t>Rest</a:t>
+              </a:r>
+            </a:p>
+          </p:txBody>
+        </p:sp>
+        <p:sp>
+          <p:nvSpPr>
+            <p:cNvPr id="32" name="U-turn Arrow 31">
+              <a:extLst>
+                <a:ext uri="{FF2B5EF4-FFF2-40B4-BE49-F238E27FC236}">
+                  <a16:creationId xmlns:a16="http://schemas.microsoft.com/office/drawing/2014/main" id="{B28B424C-471E-E60D-47AC-51F8DAA76098}"/>
+                </a:ext>
+              </a:extLst>
+            </p:cNvPr>
+            <p:cNvSpPr/>
+            <p:nvPr/>
+          </p:nvSpPr>
+          <p:spPr>
+            <a:xfrm rot="10800000">
+              <a:off x="1124406" y="4562788"/>
+              <a:ext cx="8211504" cy="1342281"/>
+            </a:xfrm>
+            <a:prstGeom prst="uturnArrow">
+              <a:avLst>
+                <a:gd name="adj1" fmla="val 12234"/>
+                <a:gd name="adj2" fmla="val 25000"/>
+                <a:gd name="adj3" fmla="val 25000"/>
+                <a:gd name="adj4" fmla="val 0"/>
+                <a:gd name="adj5" fmla="val 100000"/>
+              </a:avLst>
+            </a:prstGeom>
+            <a:solidFill>
+              <a:schemeClr val="accent4">
+                <a:lumMod val="40000"/>
+                <a:lumOff val="60000"/>
+              </a:schemeClr>
+            </a:solidFill>
+            <a:ln>
+              <a:solidFill>
+                <a:schemeClr val="accent4">
+                  <a:lumMod val="40000"/>
+                  <a:lumOff val="60000"/>
+                </a:schemeClr>
+              </a:solidFill>
+            </a:ln>
+          </p:spPr>
+          <p:style>
+            <a:lnRef idx="2">
+              <a:schemeClr val="accent1">
+                <a:shade val="50000"/>
+              </a:schemeClr>
+            </a:lnRef>
+            <a:fillRef idx="1">
+              <a:schemeClr val="accent1"/>
+            </a:fillRef>
+            <a:effectRef idx="0">
+              <a:schemeClr val="accent1"/>
+            </a:effectRef>
+            <a:fontRef idx="minor">
+              <a:schemeClr val="lt1"/>
+            </a:fontRef>
+          </p:style>
+          <p:txBody>
+            <a:bodyPr rtlCol="0" anchor="ctr"/>
+            <a:lstStyle/>
+            <a:p>
+              <a:pPr algn="ctr"/>
+              <a:endParaRPr lang="en-SE">
+                <a:solidFill>
+                  <a:schemeClr val="tx1"/>
+                </a:solidFill>
+              </a:endParaRPr>
+            </a:p>
+          </p:txBody>
+        </p:sp>
+        <p:sp>
+          <p:nvSpPr>
+            <p:cNvPr id="33" name="TextBox 32">
+              <a:extLst>
+                <a:ext uri="{FF2B5EF4-FFF2-40B4-BE49-F238E27FC236}">
+                  <a16:creationId xmlns:a16="http://schemas.microsoft.com/office/drawing/2014/main" id="{239DE386-C59F-566D-72F3-D47F2D90D4FF}"/>
+                </a:ext>
+              </a:extLst>
+            </p:cNvPr>
+            <p:cNvSpPr txBox="1"/>
+            <p:nvPr/>
+          </p:nvSpPr>
+          <p:spPr>
+            <a:xfrm>
+              <a:off x="3877418" y="5200949"/>
+              <a:ext cx="2705485" cy="523220"/>
+            </a:xfrm>
+            <a:prstGeom prst="rect">
+              <a:avLst/>
+            </a:prstGeom>
+            <a:noFill/>
+          </p:spPr>
+          <p:txBody>
+            <a:bodyPr wrap="none" rtlCol="0">
+              <a:spAutoFit/>
+            </a:bodyPr>
+            <a:lstStyle/>
+            <a:p>
+              <a:pPr algn="ctr"/>
+              <a:r>
+                <a:rPr lang="en-SE" sz="2800" dirty="0">
+                  <a:solidFill>
+                    <a:schemeClr val="bg1"/>
+                  </a:solidFill>
+                </a:rPr>
+                <a:t>(Press Space Key)</a:t>
+              </a:r>
+            </a:p>
+          </p:txBody>
+        </p:sp>
+      </p:grpSp>
+    </p:spTree>
+    <p:extLst>
+      <p:ext uri="{BB962C8B-B14F-4D97-AF65-F5344CB8AC3E}">
+        <p14:creationId xmlns:p14="http://schemas.microsoft.com/office/powerpoint/2010/main" val="1296607125"/>
       </p:ext>
     </p:extLst>
   </p:cSld>
@@ -6987,7 +8091,7 @@
         </p:nvGrpSpPr>
         <p:grpSpPr>
           <a:xfrm>
-            <a:off x="3483422" y="103762"/>
+            <a:off x="3483422" y="486382"/>
             <a:ext cx="5225155" cy="5885235"/>
             <a:chOff x="3483422" y="103762"/>
             <a:chExt cx="5225155" cy="5885235"/>

</xml_diff>